<commit_message>
Update images of Unity security guidelines document
Refer to the task unity-sds/unity-cs#36
</commit_message>
<xml_diff>
--- a/images/security-drawings.pptx
+++ b/images/security-drawings.pptx
@@ -109,6 +109,11 @@
       </a:defRPr>
     </a:lvl9pPr>
   </p:defaultTextStyle>
+  <p:extLst>
+    <p:ext uri="{EFAFB233-063F-42B5-8137-9DF3F51BA10A}">
+      <p15:sldGuideLst xmlns:p15="http://schemas.microsoft.com/office/powerpoint/2012/main"/>
+    </p:ext>
+  </p:extLst>
 </p:presentation>
 </file>
 
@@ -3514,8 +3519,8 @@
         </p:nvSpPr>
         <p:spPr>
           <a:xfrm>
-            <a:off x="0" y="141850"/>
-            <a:ext cx="11887200" cy="6858000"/>
+            <a:off x="70156" y="92160"/>
+            <a:ext cx="11676733" cy="6639790"/>
           </a:xfrm>
           <a:prstGeom prst="rect">
             <a:avLst/>
@@ -3572,7 +3577,7 @@
         </p:nvSpPr>
         <p:spPr>
           <a:xfrm>
-            <a:off x="652157" y="6362618"/>
+            <a:off x="652157" y="6321522"/>
             <a:ext cx="10582886" cy="369332"/>
           </a:xfrm>
           <a:prstGeom prst="rect">
@@ -3609,9 +3614,9 @@
         <p:grpSpPr>
           <a:xfrm>
             <a:off x="147484" y="237548"/>
-            <a:ext cx="11739716" cy="6382904"/>
+            <a:ext cx="11599403" cy="6382904"/>
             <a:chOff x="624905" y="603207"/>
-            <a:chExt cx="10800634" cy="5642943"/>
+            <a:chExt cx="10671547" cy="5642943"/>
           </a:xfrm>
         </p:grpSpPr>
         <p:sp>
@@ -6511,7 +6516,7 @@
           </p:nvSpPr>
           <p:spPr>
             <a:xfrm>
-              <a:off x="8927960" y="5390531"/>
+              <a:off x="8795626" y="5390531"/>
               <a:ext cx="2497579" cy="855619"/>
             </a:xfrm>
             <a:prstGeom prst="rect">
@@ -6577,8 +6582,8 @@
         </p:nvSpPr>
         <p:spPr>
           <a:xfrm>
-            <a:off x="0" y="0"/>
-            <a:ext cx="11887200" cy="6858000"/>
+            <a:off x="39882" y="58046"/>
+            <a:ext cx="11754851" cy="6691031"/>
           </a:xfrm>
           <a:prstGeom prst="rect">
             <a:avLst/>
@@ -6634,7 +6639,7 @@
         </p:nvSpPr>
         <p:spPr>
           <a:xfrm>
-            <a:off x="623205" y="6379745"/>
+            <a:off x="623205" y="6369471"/>
             <a:ext cx="10582886" cy="369332"/>
           </a:xfrm>
           <a:prstGeom prst="rect">
@@ -8405,8 +8410,8 @@
         </p:nvSpPr>
         <p:spPr>
           <a:xfrm>
-            <a:off x="1" y="0"/>
-            <a:ext cx="11887199" cy="6858000"/>
+            <a:off x="71920" y="53630"/>
+            <a:ext cx="11733088" cy="6750740"/>
           </a:xfrm>
           <a:prstGeom prst="rect">
             <a:avLst/>
@@ -8462,7 +8467,7 @@
         </p:nvSpPr>
         <p:spPr>
           <a:xfrm>
-            <a:off x="652156" y="6435038"/>
+            <a:off x="652156" y="6424764"/>
             <a:ext cx="10582886" cy="369332"/>
           </a:xfrm>
           <a:prstGeom prst="rect">

</xml_diff>